<commit_message>
Updated one of the citations to use UWE Hardward style
</commit_message>
<xml_diff>
--- a/Genetic_Algorithms.pptx
+++ b/Genetic_Algorithms.pptx
@@ -4192,7 +4192,7 @@
           <a:noFill/>
           <a:extLst>
             <a:ext uri="{909E8E84-426E-40dd-AFC4-6F175D3DCCD1}">
-              <a14:hiddenFill xmlns="" xmlns:a14="http://schemas.microsoft.com/office/drawing/2010/main">
+              <a14:hiddenFill xmlns:a14="http://schemas.microsoft.com/office/drawing/2010/main" xmlns="">
                 <a:solidFill>
                   <a:srgbClr val="FFFFFF"/>
                 </a:solidFill>
@@ -4252,7 +4252,7 @@
             </a:ln>
             <a:extLst>
               <a:ext uri="{91240B29-F687-4f45-9708-019B960494DF}">
-                <a14:hiddenLine xmlns="" xmlns:a14="http://schemas.microsoft.com/office/drawing/2010/main" w="9525">
+                <a14:hiddenLine xmlns:a14="http://schemas.microsoft.com/office/drawing/2010/main" xmlns="" w="9525">
                   <a:solidFill>
                     <a:srgbClr val="000000"/>
                   </a:solidFill>
@@ -4342,7 +4342,7 @@
             </a:ln>
             <a:extLst>
               <a:ext uri="{91240B29-F687-4f45-9708-019B960494DF}">
-                <a14:hiddenLine xmlns="" xmlns:a14="http://schemas.microsoft.com/office/drawing/2010/main" w="9525">
+                <a14:hiddenLine xmlns:a14="http://schemas.microsoft.com/office/drawing/2010/main" xmlns="" w="9525">
                   <a:solidFill>
                     <a:srgbClr val="000000"/>
                   </a:solidFill>
@@ -4432,7 +4432,7 @@
             </a:ln>
             <a:extLst>
               <a:ext uri="{91240B29-F687-4f45-9708-019B960494DF}">
-                <a14:hiddenLine xmlns="" xmlns:a14="http://schemas.microsoft.com/office/drawing/2010/main" w="9525">
+                <a14:hiddenLine xmlns:a14="http://schemas.microsoft.com/office/drawing/2010/main" xmlns="" w="9525">
                   <a:solidFill>
                     <a:srgbClr val="000000"/>
                   </a:solidFill>
@@ -4466,7 +4466,7 @@
             </a:ln>
             <a:extLst>
               <a:ext uri="{91240B29-F687-4f45-9708-019B960494DF}">
-                <a14:hiddenLine xmlns="" xmlns:a14="http://schemas.microsoft.com/office/drawing/2010/main" w="9525">
+                <a14:hiddenLine xmlns:a14="http://schemas.microsoft.com/office/drawing/2010/main" xmlns="" w="9525">
                   <a:solidFill>
                     <a:srgbClr val="000000"/>
                   </a:solidFill>
@@ -4556,7 +4556,7 @@
             </a:ln>
             <a:extLst>
               <a:ext uri="{91240B29-F687-4f45-9708-019B960494DF}">
-                <a14:hiddenLine xmlns="" xmlns:a14="http://schemas.microsoft.com/office/drawing/2010/main" w="9525">
+                <a14:hiddenLine xmlns:a14="http://schemas.microsoft.com/office/drawing/2010/main" xmlns="" w="9525">
                   <a:solidFill>
                     <a:srgbClr val="000000"/>
                   </a:solidFill>
@@ -4618,7 +4618,7 @@
             </a:ln>
             <a:extLst>
               <a:ext uri="{91240B29-F687-4f45-9708-019B960494DF}">
-                <a14:hiddenLine xmlns="" xmlns:a14="http://schemas.microsoft.com/office/drawing/2010/main" w="9525">
+                <a14:hiddenLine xmlns:a14="http://schemas.microsoft.com/office/drawing/2010/main" xmlns="" w="9525">
                   <a:solidFill>
                     <a:srgbClr val="000000"/>
                   </a:solidFill>
@@ -4680,7 +4680,7 @@
             </a:ln>
             <a:extLst>
               <a:ext uri="{91240B29-F687-4f45-9708-019B960494DF}">
-                <a14:hiddenLine xmlns="" xmlns:a14="http://schemas.microsoft.com/office/drawing/2010/main" w="9525">
+                <a14:hiddenLine xmlns:a14="http://schemas.microsoft.com/office/drawing/2010/main" xmlns="" w="9525">
                   <a:solidFill>
                     <a:srgbClr val="000000"/>
                   </a:solidFill>
@@ -4770,7 +4770,7 @@
             </a:ln>
             <a:extLst>
               <a:ext uri="{91240B29-F687-4f45-9708-019B960494DF}">
-                <a14:hiddenLine xmlns="" xmlns:a14="http://schemas.microsoft.com/office/drawing/2010/main" w="9525">
+                <a14:hiddenLine xmlns:a14="http://schemas.microsoft.com/office/drawing/2010/main" xmlns="" w="9525">
                   <a:solidFill>
                     <a:srgbClr val="000000"/>
                   </a:solidFill>
@@ -4832,7 +4832,7 @@
             </a:ln>
             <a:extLst>
               <a:ext uri="{91240B29-F687-4f45-9708-019B960494DF}">
-                <a14:hiddenLine xmlns="" xmlns:a14="http://schemas.microsoft.com/office/drawing/2010/main" w="9525">
+                <a14:hiddenLine xmlns:a14="http://schemas.microsoft.com/office/drawing/2010/main" xmlns="" w="9525">
                   <a:solidFill>
                     <a:srgbClr val="000000"/>
                   </a:solidFill>
@@ -4894,7 +4894,7 @@
             </a:ln>
             <a:extLst>
               <a:ext uri="{91240B29-F687-4f45-9708-019B960494DF}">
-                <a14:hiddenLine xmlns="" xmlns:a14="http://schemas.microsoft.com/office/drawing/2010/main" w="9525">
+                <a14:hiddenLine xmlns:a14="http://schemas.microsoft.com/office/drawing/2010/main" xmlns="" w="9525">
                   <a:solidFill>
                     <a:srgbClr val="000000"/>
                   </a:solidFill>
@@ -4984,7 +4984,7 @@
             </a:ln>
             <a:extLst>
               <a:ext uri="{91240B29-F687-4f45-9708-019B960494DF}">
-                <a14:hiddenLine xmlns="" xmlns:a14="http://schemas.microsoft.com/office/drawing/2010/main" w="9525">
+                <a14:hiddenLine xmlns:a14="http://schemas.microsoft.com/office/drawing/2010/main" xmlns="" w="9525">
                   <a:solidFill>
                     <a:srgbClr val="000000"/>
                   </a:solidFill>
@@ -5074,7 +5074,7 @@
             </a:ln>
             <a:extLst>
               <a:ext uri="{91240B29-F687-4f45-9708-019B960494DF}">
-                <a14:hiddenLine xmlns="" xmlns:a14="http://schemas.microsoft.com/office/drawing/2010/main" w="9525">
+                <a14:hiddenLine xmlns:a14="http://schemas.microsoft.com/office/drawing/2010/main" xmlns="" w="9525">
                   <a:solidFill>
                     <a:srgbClr val="000000"/>
                   </a:solidFill>
@@ -5136,7 +5136,7 @@
             </a:ln>
             <a:extLst>
               <a:ext uri="{91240B29-F687-4f45-9708-019B960494DF}">
-                <a14:hiddenLine xmlns="" xmlns:a14="http://schemas.microsoft.com/office/drawing/2010/main" w="9525">
+                <a14:hiddenLine xmlns:a14="http://schemas.microsoft.com/office/drawing/2010/main" xmlns="" w="9525">
                   <a:solidFill>
                     <a:srgbClr val="000000"/>
                   </a:solidFill>
@@ -5246,7 +5246,7 @@
             </a:ln>
             <a:extLst>
               <a:ext uri="{91240B29-F687-4f45-9708-019B960494DF}">
-                <a14:hiddenLine xmlns="" xmlns:a14="http://schemas.microsoft.com/office/drawing/2010/main" w="9525">
+                <a14:hiddenLine xmlns:a14="http://schemas.microsoft.com/office/drawing/2010/main" xmlns="" w="9525">
                   <a:solidFill>
                     <a:srgbClr val="000000"/>
                   </a:solidFill>
@@ -5308,7 +5308,7 @@
             </a:ln>
             <a:extLst>
               <a:ext uri="{91240B29-F687-4f45-9708-019B960494DF}">
-                <a14:hiddenLine xmlns="" xmlns:a14="http://schemas.microsoft.com/office/drawing/2010/main" w="9525">
+                <a14:hiddenLine xmlns:a14="http://schemas.microsoft.com/office/drawing/2010/main" xmlns="" w="9525">
                   <a:solidFill>
                     <a:srgbClr val="000000"/>
                   </a:solidFill>
@@ -5398,7 +5398,7 @@
             </a:ln>
             <a:extLst>
               <a:ext uri="{91240B29-F687-4f45-9708-019B960494DF}">
-                <a14:hiddenLine xmlns="" xmlns:a14="http://schemas.microsoft.com/office/drawing/2010/main" w="9525">
+                <a14:hiddenLine xmlns:a14="http://schemas.microsoft.com/office/drawing/2010/main" xmlns="" w="9525">
                   <a:solidFill>
                     <a:srgbClr val="000000"/>
                   </a:solidFill>
@@ -5488,7 +5488,7 @@
             </a:ln>
             <a:extLst>
               <a:ext uri="{91240B29-F687-4f45-9708-019B960494DF}">
-                <a14:hiddenLine xmlns="" xmlns:a14="http://schemas.microsoft.com/office/drawing/2010/main" w="9525">
+                <a14:hiddenLine xmlns:a14="http://schemas.microsoft.com/office/drawing/2010/main" xmlns="" w="9525">
                   <a:solidFill>
                     <a:srgbClr val="000000"/>
                   </a:solidFill>
@@ -5550,7 +5550,7 @@
             </a:ln>
             <a:extLst>
               <a:ext uri="{91240B29-F687-4f45-9708-019B960494DF}">
-                <a14:hiddenLine xmlns="" xmlns:a14="http://schemas.microsoft.com/office/drawing/2010/main" w="9525">
+                <a14:hiddenLine xmlns:a14="http://schemas.microsoft.com/office/drawing/2010/main" xmlns="" w="9525">
                   <a:solidFill>
                     <a:srgbClr val="000000"/>
                   </a:solidFill>
@@ -5640,7 +5640,7 @@
             </a:ln>
             <a:extLst>
               <a:ext uri="{91240B29-F687-4f45-9708-019B960494DF}">
-                <a14:hiddenLine xmlns="" xmlns:a14="http://schemas.microsoft.com/office/drawing/2010/main" w="9525">
+                <a14:hiddenLine xmlns:a14="http://schemas.microsoft.com/office/drawing/2010/main" xmlns="" w="9525">
                   <a:solidFill>
                     <a:srgbClr val="000000"/>
                   </a:solidFill>
@@ -5730,7 +5730,7 @@
             </a:ln>
             <a:extLst>
               <a:ext uri="{91240B29-F687-4f45-9708-019B960494DF}">
-                <a14:hiddenLine xmlns="" xmlns:a14="http://schemas.microsoft.com/office/drawing/2010/main" w="9525">
+                <a14:hiddenLine xmlns:a14="http://schemas.microsoft.com/office/drawing/2010/main" xmlns="" w="9525">
                   <a:solidFill>
                     <a:srgbClr val="000000"/>
                   </a:solidFill>
@@ -5786,7 +5786,7 @@
             </a:ln>
             <a:extLst>
               <a:ext uri="{91240B29-F687-4f45-9708-019B960494DF}">
-                <a14:hiddenLine xmlns="" xmlns:a14="http://schemas.microsoft.com/office/drawing/2010/main" w="9525">
+                <a14:hiddenLine xmlns:a14="http://schemas.microsoft.com/office/drawing/2010/main" xmlns="" w="9525">
                   <a:solidFill>
                     <a:srgbClr val="000000"/>
                   </a:solidFill>
@@ -5876,7 +5876,7 @@
             </a:ln>
             <a:extLst>
               <a:ext uri="{91240B29-F687-4f45-9708-019B960494DF}">
-                <a14:hiddenLine xmlns="" xmlns:a14="http://schemas.microsoft.com/office/drawing/2010/main" w="9525">
+                <a14:hiddenLine xmlns:a14="http://schemas.microsoft.com/office/drawing/2010/main" xmlns="" w="9525">
                   <a:solidFill>
                     <a:srgbClr val="000000"/>
                   </a:solidFill>
@@ -5932,7 +5932,7 @@
             </a:ln>
             <a:extLst>
               <a:ext uri="{91240B29-F687-4f45-9708-019B960494DF}">
-                <a14:hiddenLine xmlns="" xmlns:a14="http://schemas.microsoft.com/office/drawing/2010/main" w="9525">
+                <a14:hiddenLine xmlns:a14="http://schemas.microsoft.com/office/drawing/2010/main" xmlns="" w="9525">
                   <a:solidFill>
                     <a:srgbClr val="000000"/>
                   </a:solidFill>
@@ -6022,7 +6022,7 @@
             </a:ln>
             <a:extLst>
               <a:ext uri="{91240B29-F687-4f45-9708-019B960494DF}">
-                <a14:hiddenLine xmlns="" xmlns:a14="http://schemas.microsoft.com/office/drawing/2010/main" w="9525">
+                <a14:hiddenLine xmlns:a14="http://schemas.microsoft.com/office/drawing/2010/main" xmlns="" w="9525">
                   <a:solidFill>
                     <a:srgbClr val="000000"/>
                   </a:solidFill>
@@ -6090,7 +6090,7 @@
             </a:ln>
             <a:extLst>
               <a:ext uri="{91240B29-F687-4f45-9708-019B960494DF}">
-                <a14:hiddenLine xmlns="" xmlns:a14="http://schemas.microsoft.com/office/drawing/2010/main" w="9525">
+                <a14:hiddenLine xmlns:a14="http://schemas.microsoft.com/office/drawing/2010/main" xmlns="" w="9525">
                   <a:solidFill>
                     <a:srgbClr val="000000"/>
                   </a:solidFill>
@@ -6180,7 +6180,7 @@
             </a:ln>
             <a:extLst>
               <a:ext uri="{91240B29-F687-4f45-9708-019B960494DF}">
-                <a14:hiddenLine xmlns="" xmlns:a14="http://schemas.microsoft.com/office/drawing/2010/main" w="9525">
+                <a14:hiddenLine xmlns:a14="http://schemas.microsoft.com/office/drawing/2010/main" xmlns="" w="9525">
                   <a:solidFill>
                     <a:srgbClr val="000000"/>
                   </a:solidFill>
@@ -6248,7 +6248,7 @@
             </a:ln>
             <a:extLst>
               <a:ext uri="{91240B29-F687-4f45-9708-019B960494DF}">
-                <a14:hiddenLine xmlns="" xmlns:a14="http://schemas.microsoft.com/office/drawing/2010/main" w="9525">
+                <a14:hiddenLine xmlns:a14="http://schemas.microsoft.com/office/drawing/2010/main" xmlns="" w="9525">
                   <a:solidFill>
                     <a:srgbClr val="000000"/>
                   </a:solidFill>
@@ -6338,7 +6338,7 @@
             </a:ln>
             <a:extLst>
               <a:ext uri="{91240B29-F687-4f45-9708-019B960494DF}">
-                <a14:hiddenLine xmlns="" xmlns:a14="http://schemas.microsoft.com/office/drawing/2010/main" w="9525">
+                <a14:hiddenLine xmlns:a14="http://schemas.microsoft.com/office/drawing/2010/main" xmlns="" w="9525">
                   <a:solidFill>
                     <a:srgbClr val="000000"/>
                   </a:solidFill>
@@ -6372,7 +6372,7 @@
             </a:ln>
             <a:extLst>
               <a:ext uri="{91240B29-F687-4f45-9708-019B960494DF}">
-                <a14:hiddenLine xmlns="" xmlns:a14="http://schemas.microsoft.com/office/drawing/2010/main" w="9525">
+                <a14:hiddenLine xmlns:a14="http://schemas.microsoft.com/office/drawing/2010/main" xmlns="" w="9525">
                   <a:solidFill>
                     <a:srgbClr val="000000"/>
                   </a:solidFill>
@@ -6462,7 +6462,7 @@
             </a:ln>
             <a:extLst>
               <a:ext uri="{91240B29-F687-4f45-9708-019B960494DF}">
-                <a14:hiddenLine xmlns="" xmlns:a14="http://schemas.microsoft.com/office/drawing/2010/main" w="9525">
+                <a14:hiddenLine xmlns:a14="http://schemas.microsoft.com/office/drawing/2010/main" xmlns="" w="9525">
                   <a:solidFill>
                     <a:srgbClr val="000000"/>
                   </a:solidFill>
@@ -6524,7 +6524,7 @@
             </a:ln>
             <a:extLst>
               <a:ext uri="{91240B29-F687-4f45-9708-019B960494DF}">
-                <a14:hiddenLine xmlns="" xmlns:a14="http://schemas.microsoft.com/office/drawing/2010/main" w="9525">
+                <a14:hiddenLine xmlns:a14="http://schemas.microsoft.com/office/drawing/2010/main" xmlns="" w="9525">
                   <a:solidFill>
                     <a:srgbClr val="000000"/>
                   </a:solidFill>
@@ -6586,7 +6586,7 @@
             </a:ln>
             <a:extLst>
               <a:ext uri="{91240B29-F687-4f45-9708-019B960494DF}">
-                <a14:hiddenLine xmlns="" xmlns:a14="http://schemas.microsoft.com/office/drawing/2010/main" w="9525">
+                <a14:hiddenLine xmlns:a14="http://schemas.microsoft.com/office/drawing/2010/main" xmlns="" w="9525">
                   <a:solidFill>
                     <a:srgbClr val="000000"/>
                   </a:solidFill>
@@ -6676,7 +6676,7 @@
             </a:ln>
             <a:extLst>
               <a:ext uri="{91240B29-F687-4f45-9708-019B960494DF}">
-                <a14:hiddenLine xmlns="" xmlns:a14="http://schemas.microsoft.com/office/drawing/2010/main" w="9525">
+                <a14:hiddenLine xmlns:a14="http://schemas.microsoft.com/office/drawing/2010/main" xmlns="" w="9525">
                   <a:solidFill>
                     <a:srgbClr val="000000"/>
                   </a:solidFill>
@@ -6744,7 +6744,7 @@
             </a:ln>
             <a:extLst>
               <a:ext uri="{91240B29-F687-4f45-9708-019B960494DF}">
-                <a14:hiddenLine xmlns="" xmlns:a14="http://schemas.microsoft.com/office/drawing/2010/main" w="9525">
+                <a14:hiddenLine xmlns:a14="http://schemas.microsoft.com/office/drawing/2010/main" xmlns="" w="9525">
                   <a:solidFill>
                     <a:srgbClr val="000000"/>
                   </a:solidFill>
@@ -6806,7 +6806,7 @@
             </a:ln>
             <a:extLst>
               <a:ext uri="{91240B29-F687-4f45-9708-019B960494DF}">
-                <a14:hiddenLine xmlns="" xmlns:a14="http://schemas.microsoft.com/office/drawing/2010/main" w="9525">
+                <a14:hiddenLine xmlns:a14="http://schemas.microsoft.com/office/drawing/2010/main" xmlns="" w="9525">
                   <a:solidFill>
                     <a:srgbClr val="000000"/>
                   </a:solidFill>
@@ -6896,7 +6896,7 @@
             </a:ln>
             <a:extLst>
               <a:ext uri="{91240B29-F687-4f45-9708-019B960494DF}">
-                <a14:hiddenLine xmlns="" xmlns:a14="http://schemas.microsoft.com/office/drawing/2010/main" w="9525">
+                <a14:hiddenLine xmlns:a14="http://schemas.microsoft.com/office/drawing/2010/main" xmlns="" w="9525">
                   <a:solidFill>
                     <a:srgbClr val="000000"/>
                   </a:solidFill>
@@ -6958,7 +6958,7 @@
             </a:ln>
             <a:extLst>
               <a:ext uri="{91240B29-F687-4f45-9708-019B960494DF}">
-                <a14:hiddenLine xmlns="" xmlns:a14="http://schemas.microsoft.com/office/drawing/2010/main" w="9525">
+                <a14:hiddenLine xmlns:a14="http://schemas.microsoft.com/office/drawing/2010/main" xmlns="" w="9525">
                   <a:solidFill>
                     <a:srgbClr val="000000"/>
                   </a:solidFill>
@@ -7048,7 +7048,7 @@
             </a:ln>
             <a:extLst>
               <a:ext uri="{91240B29-F687-4f45-9708-019B960494DF}">
-                <a14:hiddenLine xmlns="" xmlns:a14="http://schemas.microsoft.com/office/drawing/2010/main" w="9525">
+                <a14:hiddenLine xmlns:a14="http://schemas.microsoft.com/office/drawing/2010/main" xmlns="" w="9525">
                   <a:solidFill>
                     <a:srgbClr val="000000"/>
                   </a:solidFill>
@@ -7110,7 +7110,7 @@
             </a:ln>
             <a:extLst>
               <a:ext uri="{91240B29-F687-4f45-9708-019B960494DF}">
-                <a14:hiddenLine xmlns="" xmlns:a14="http://schemas.microsoft.com/office/drawing/2010/main" w="9525">
+                <a14:hiddenLine xmlns:a14="http://schemas.microsoft.com/office/drawing/2010/main" xmlns="" w="9525">
                   <a:solidFill>
                     <a:srgbClr val="000000"/>
                   </a:solidFill>
@@ -7200,7 +7200,7 @@
             </a:ln>
             <a:extLst>
               <a:ext uri="{91240B29-F687-4f45-9708-019B960494DF}">
-                <a14:hiddenLine xmlns="" xmlns:a14="http://schemas.microsoft.com/office/drawing/2010/main" w="9525">
+                <a14:hiddenLine xmlns:a14="http://schemas.microsoft.com/office/drawing/2010/main" xmlns="" w="9525">
                   <a:solidFill>
                     <a:srgbClr val="000000"/>
                   </a:solidFill>
@@ -7234,7 +7234,7 @@
             </a:ln>
             <a:extLst>
               <a:ext uri="{91240B29-F687-4f45-9708-019B960494DF}">
-                <a14:hiddenLine xmlns="" xmlns:a14="http://schemas.microsoft.com/office/drawing/2010/main" w="9525">
+                <a14:hiddenLine xmlns:a14="http://schemas.microsoft.com/office/drawing/2010/main" xmlns="" w="9525">
                   <a:solidFill>
                     <a:srgbClr val="000000"/>
                   </a:solidFill>
@@ -7299,7 +7299,7 @@
             </a:ln>
             <a:extLst>
               <a:ext uri="{91240B29-F687-4f45-9708-019B960494DF}">
-                <a14:hiddenLine xmlns="" xmlns:a14="http://schemas.microsoft.com/office/drawing/2010/main" w="9525">
+                <a14:hiddenLine xmlns:a14="http://schemas.microsoft.com/office/drawing/2010/main" xmlns="" w="9525">
                   <a:solidFill>
                     <a:srgbClr val="000000"/>
                   </a:solidFill>
@@ -7389,7 +7389,7 @@
             </a:ln>
             <a:extLst>
               <a:ext uri="{91240B29-F687-4f45-9708-019B960494DF}">
-                <a14:hiddenLine xmlns="" xmlns:a14="http://schemas.microsoft.com/office/drawing/2010/main" w="9525">
+                <a14:hiddenLine xmlns:a14="http://schemas.microsoft.com/office/drawing/2010/main" xmlns="" w="9525">
                   <a:solidFill>
                     <a:srgbClr val="000000"/>
                   </a:solidFill>
@@ -7451,7 +7451,7 @@
             </a:ln>
             <a:extLst>
               <a:ext uri="{91240B29-F687-4f45-9708-019B960494DF}">
-                <a14:hiddenLine xmlns="" xmlns:a14="http://schemas.microsoft.com/office/drawing/2010/main" w="9525">
+                <a14:hiddenLine xmlns:a14="http://schemas.microsoft.com/office/drawing/2010/main" xmlns="" w="9525">
                   <a:solidFill>
                     <a:srgbClr val="000000"/>
                   </a:solidFill>
@@ -7541,7 +7541,7 @@
             </a:ln>
             <a:extLst>
               <a:ext uri="{91240B29-F687-4f45-9708-019B960494DF}">
-                <a14:hiddenLine xmlns="" xmlns:a14="http://schemas.microsoft.com/office/drawing/2010/main" w="9525">
+                <a14:hiddenLine xmlns:a14="http://schemas.microsoft.com/office/drawing/2010/main" xmlns="" w="9525">
                   <a:solidFill>
                     <a:srgbClr val="000000"/>
                   </a:solidFill>
@@ -7631,7 +7631,7 @@
             </a:ln>
             <a:extLst>
               <a:ext uri="{91240B29-F687-4f45-9708-019B960494DF}">
-                <a14:hiddenLine xmlns="" xmlns:a14="http://schemas.microsoft.com/office/drawing/2010/main" w="9525">
+                <a14:hiddenLine xmlns:a14="http://schemas.microsoft.com/office/drawing/2010/main" xmlns="" w="9525">
                   <a:solidFill>
                     <a:srgbClr val="000000"/>
                   </a:solidFill>
@@ -7696,7 +7696,7 @@
             </a:ln>
             <a:extLst>
               <a:ext uri="{91240B29-F687-4f45-9708-019B960494DF}">
-                <a14:hiddenLine xmlns="" xmlns:a14="http://schemas.microsoft.com/office/drawing/2010/main" w="9525">
+                <a14:hiddenLine xmlns:a14="http://schemas.microsoft.com/office/drawing/2010/main" xmlns="" w="9525">
                   <a:solidFill>
                     <a:srgbClr val="000000"/>
                   </a:solidFill>
@@ -7758,7 +7758,7 @@
             </a:ln>
             <a:extLst>
               <a:ext uri="{91240B29-F687-4f45-9708-019B960494DF}">
-                <a14:hiddenLine xmlns="" xmlns:a14="http://schemas.microsoft.com/office/drawing/2010/main" w="9525">
+                <a14:hiddenLine xmlns:a14="http://schemas.microsoft.com/office/drawing/2010/main" xmlns="" w="9525">
                   <a:solidFill>
                     <a:srgbClr val="000000"/>
                   </a:solidFill>
@@ -7848,7 +7848,7 @@
             </a:ln>
             <a:extLst>
               <a:ext uri="{91240B29-F687-4f45-9708-019B960494DF}">
-                <a14:hiddenLine xmlns="" xmlns:a14="http://schemas.microsoft.com/office/drawing/2010/main" w="9525">
+                <a14:hiddenLine xmlns:a14="http://schemas.microsoft.com/office/drawing/2010/main" xmlns="" w="9525">
                   <a:solidFill>
                     <a:srgbClr val="000000"/>
                   </a:solidFill>
@@ -7938,7 +7938,7 @@
             </a:ln>
             <a:extLst>
               <a:ext uri="{91240B29-F687-4f45-9708-019B960494DF}">
-                <a14:hiddenLine xmlns="" xmlns:a14="http://schemas.microsoft.com/office/drawing/2010/main" w="9525">
+                <a14:hiddenLine xmlns:a14="http://schemas.microsoft.com/office/drawing/2010/main" xmlns="" w="9525">
                   <a:solidFill>
                     <a:srgbClr val="000000"/>
                   </a:solidFill>
@@ -8000,7 +8000,7 @@
             </a:ln>
             <a:extLst>
               <a:ext uri="{91240B29-F687-4f45-9708-019B960494DF}">
-                <a14:hiddenLine xmlns="" xmlns:a14="http://schemas.microsoft.com/office/drawing/2010/main" w="9525">
+                <a14:hiddenLine xmlns:a14="http://schemas.microsoft.com/office/drawing/2010/main" xmlns="" w="9525">
                   <a:solidFill>
                     <a:srgbClr val="000000"/>
                   </a:solidFill>
@@ -8120,7 +8120,7 @@
             </a:ln>
             <a:extLst>
               <a:ext uri="{91240B29-F687-4f45-9708-019B960494DF}">
-                <a14:hiddenLine xmlns="" xmlns:a14="http://schemas.microsoft.com/office/drawing/2010/main" w="9525">
+                <a14:hiddenLine xmlns:a14="http://schemas.microsoft.com/office/drawing/2010/main" xmlns="" w="9525">
                   <a:solidFill>
                     <a:srgbClr val="000000"/>
                   </a:solidFill>
@@ -8188,7 +8188,7 @@
             </a:ln>
             <a:extLst>
               <a:ext uri="{91240B29-F687-4f45-9708-019B960494DF}">
-                <a14:hiddenLine xmlns="" xmlns:a14="http://schemas.microsoft.com/office/drawing/2010/main" w="9525">
+                <a14:hiddenLine xmlns:a14="http://schemas.microsoft.com/office/drawing/2010/main" xmlns="" w="9525">
                   <a:solidFill>
                     <a:srgbClr val="000000"/>
                   </a:solidFill>
@@ -8278,7 +8278,7 @@
             </a:ln>
             <a:extLst>
               <a:ext uri="{91240B29-F687-4f45-9708-019B960494DF}">
-                <a14:hiddenLine xmlns="" xmlns:a14="http://schemas.microsoft.com/office/drawing/2010/main" w="9525">
+                <a14:hiddenLine xmlns:a14="http://schemas.microsoft.com/office/drawing/2010/main" xmlns="" w="9525">
                   <a:solidFill>
                     <a:srgbClr val="000000"/>
                   </a:solidFill>
@@ -8418,7 +8418,7 @@
           <a:p>
             <a:fld id="{48A87A34-81AB-432B-8DAE-1953F412C126}" type="datetimeFigureOut">
               <a:rPr lang="en-US" dirty="0"/>
-              <a:t>11/29/2018</a:t>
+              <a:t>11/29/18</a:t>
             </a:fld>
             <a:endParaRPr lang="en-US" dirty="0"/>
           </a:p>
@@ -8680,7 +8680,7 @@
           <a:p>
             <a:fld id="{48A87A34-81AB-432B-8DAE-1953F412C126}" type="datetimeFigureOut">
               <a:rPr lang="en-US" dirty="0"/>
-              <a:t>11/29/2018</a:t>
+              <a:t>11/29/18</a:t>
             </a:fld>
             <a:endParaRPr lang="en-US" dirty="0"/>
           </a:p>
@@ -8871,7 +8871,7 @@
           <a:p>
             <a:fld id="{48A87A34-81AB-432B-8DAE-1953F412C126}" type="datetimeFigureOut">
               <a:rPr lang="en-US" dirty="0"/>
-              <a:t>11/29/2018</a:t>
+              <a:t>11/29/18</a:t>
             </a:fld>
             <a:endParaRPr lang="en-US" dirty="0"/>
           </a:p>
@@ -9129,7 +9129,7 @@
           <a:p>
             <a:fld id="{48A87A34-81AB-432B-8DAE-1953F412C126}" type="datetimeFigureOut">
               <a:rPr lang="en-US" dirty="0"/>
-              <a:t>11/29/2018</a:t>
+              <a:t>11/29/18</a:t>
             </a:fld>
             <a:endParaRPr lang="en-US" dirty="0"/>
           </a:p>
@@ -9558,7 +9558,7 @@
           <a:p>
             <a:fld id="{48A87A34-81AB-432B-8DAE-1953F412C126}" type="datetimeFigureOut">
               <a:rPr lang="en-US" dirty="0"/>
-              <a:t>11/29/2018</a:t>
+              <a:t>11/29/18</a:t>
             </a:fld>
             <a:endParaRPr lang="en-US" dirty="0"/>
           </a:p>
@@ -10099,7 +10099,7 @@
           <a:p>
             <a:fld id="{48A87A34-81AB-432B-8DAE-1953F412C126}" type="datetimeFigureOut">
               <a:rPr lang="en-US" dirty="0"/>
-              <a:t>11/29/2018</a:t>
+              <a:t>11/29/18</a:t>
             </a:fld>
             <a:endParaRPr lang="en-US" dirty="0"/>
           </a:p>
@@ -10814,7 +10814,7 @@
           <a:p>
             <a:fld id="{48A87A34-81AB-432B-8DAE-1953F412C126}" type="datetimeFigureOut">
               <a:rPr lang="en-US" dirty="0"/>
-              <a:t>11/29/2018</a:t>
+              <a:t>11/29/18</a:t>
             </a:fld>
             <a:endParaRPr lang="en-US" dirty="0"/>
           </a:p>
@@ -10979,7 +10979,7 @@
           <a:p>
             <a:fld id="{48A87A34-81AB-432B-8DAE-1953F412C126}" type="datetimeFigureOut">
               <a:rPr lang="en-US" dirty="0"/>
-              <a:t>11/29/2018</a:t>
+              <a:t>11/29/18</a:t>
             </a:fld>
             <a:endParaRPr lang="en-US" dirty="0"/>
           </a:p>
@@ -11154,7 +11154,7 @@
           <a:p>
             <a:fld id="{48A87A34-81AB-432B-8DAE-1953F412C126}" type="datetimeFigureOut">
               <a:rPr lang="en-US" dirty="0"/>
-              <a:t>11/29/2018</a:t>
+              <a:t>11/29/18</a:t>
             </a:fld>
             <a:endParaRPr lang="en-US" dirty="0"/>
           </a:p>
@@ -11319,7 +11319,7 @@
           <a:p>
             <a:fld id="{48A87A34-81AB-432B-8DAE-1953F412C126}" type="datetimeFigureOut">
               <a:rPr lang="en-US" dirty="0"/>
-              <a:t>11/29/2018</a:t>
+              <a:t>11/29/18</a:t>
             </a:fld>
             <a:endParaRPr lang="en-US" dirty="0"/>
           </a:p>
@@ -11564,7 +11564,7 @@
           <a:p>
             <a:fld id="{48A87A34-81AB-432B-8DAE-1953F412C126}" type="datetimeFigureOut">
               <a:rPr lang="en-US" dirty="0"/>
-              <a:t>11/29/2018</a:t>
+              <a:t>11/29/18</a:t>
             </a:fld>
             <a:endParaRPr lang="en-US" dirty="0"/>
           </a:p>
@@ -11791,7 +11791,7 @@
           <a:p>
             <a:fld id="{48A87A34-81AB-432B-8DAE-1953F412C126}" type="datetimeFigureOut">
               <a:rPr lang="en-US" dirty="0"/>
-              <a:t>11/29/2018</a:t>
+              <a:t>11/29/18</a:t>
             </a:fld>
             <a:endParaRPr lang="en-US" dirty="0"/>
           </a:p>
@@ -12167,7 +12167,7 @@
           <a:p>
             <a:fld id="{48A87A34-81AB-432B-8DAE-1953F412C126}" type="datetimeFigureOut">
               <a:rPr lang="en-US" dirty="0"/>
-              <a:t>11/29/2018</a:t>
+              <a:t>11/29/18</a:t>
             </a:fld>
             <a:endParaRPr lang="en-US" dirty="0"/>
           </a:p>
@@ -12280,7 +12280,7 @@
           <a:p>
             <a:fld id="{48A87A34-81AB-432B-8DAE-1953F412C126}" type="datetimeFigureOut">
               <a:rPr lang="en-US" dirty="0"/>
-              <a:t>11/29/2018</a:t>
+              <a:t>11/29/18</a:t>
             </a:fld>
             <a:endParaRPr lang="en-US" dirty="0"/>
           </a:p>
@@ -12370,7 +12370,7 @@
           <a:p>
             <a:fld id="{48A87A34-81AB-432B-8DAE-1953F412C126}" type="datetimeFigureOut">
               <a:rPr lang="en-US" dirty="0"/>
-              <a:t>11/29/2018</a:t>
+              <a:t>11/29/18</a:t>
             </a:fld>
             <a:endParaRPr lang="en-US" dirty="0"/>
           </a:p>
@@ -12614,7 +12614,7 @@
           <a:p>
             <a:fld id="{48A87A34-81AB-432B-8DAE-1953F412C126}" type="datetimeFigureOut">
               <a:rPr lang="en-US" dirty="0"/>
-              <a:t>11/29/2018</a:t>
+              <a:t>11/29/18</a:t>
             </a:fld>
             <a:endParaRPr lang="en-US" dirty="0"/>
           </a:p>
@@ -12889,7 +12889,7 @@
           <a:p>
             <a:fld id="{48A87A34-81AB-432B-8DAE-1953F412C126}" type="datetimeFigureOut">
               <a:rPr lang="en-US" dirty="0"/>
-              <a:t>11/29/2018</a:t>
+              <a:t>11/29/18</a:t>
             </a:fld>
             <a:endParaRPr lang="en-US" dirty="0"/>
           </a:p>
@@ -13000,7 +13000,7 @@
           <a:noFill/>
           <a:extLst>
             <a:ext uri="{909E8E84-426E-40dd-AFC4-6F175D3DCCD1}">
-              <a14:hiddenFill xmlns="" xmlns:a14="http://schemas.microsoft.com/office/drawing/2010/main">
+              <a14:hiddenFill xmlns:a14="http://schemas.microsoft.com/office/drawing/2010/main" xmlns="">
                 <a:solidFill>
                   <a:srgbClr val="FFFFFF"/>
                 </a:solidFill>
@@ -13074,7 +13074,7 @@
               </a:ln>
               <a:extLst>
                 <a:ext uri="{91240B29-F687-4f45-9708-019B960494DF}">
-                  <a14:hiddenLine xmlns="" xmlns:a14="http://schemas.microsoft.com/office/drawing/2010/main" w="9525">
+                  <a14:hiddenLine xmlns:a14="http://schemas.microsoft.com/office/drawing/2010/main" xmlns="" w="9525">
                     <a:solidFill>
                       <a:srgbClr val="000000"/>
                     </a:solidFill>
@@ -13164,7 +13164,7 @@
               </a:ln>
               <a:extLst>
                 <a:ext uri="{91240B29-F687-4f45-9708-019B960494DF}">
-                  <a14:hiddenLine xmlns="" xmlns:a14="http://schemas.microsoft.com/office/drawing/2010/main" w="9525">
+                  <a14:hiddenLine xmlns:a14="http://schemas.microsoft.com/office/drawing/2010/main" xmlns="" w="9525">
                     <a:solidFill>
                       <a:srgbClr val="000000"/>
                     </a:solidFill>
@@ -13254,7 +13254,7 @@
               </a:ln>
               <a:extLst>
                 <a:ext uri="{91240B29-F687-4f45-9708-019B960494DF}">
-                  <a14:hiddenLine xmlns="" xmlns:a14="http://schemas.microsoft.com/office/drawing/2010/main" w="9525">
+                  <a14:hiddenLine xmlns:a14="http://schemas.microsoft.com/office/drawing/2010/main" xmlns="" w="9525">
                     <a:solidFill>
                       <a:srgbClr val="000000"/>
                     </a:solidFill>
@@ -13316,7 +13316,7 @@
               </a:ln>
               <a:extLst>
                 <a:ext uri="{91240B29-F687-4f45-9708-019B960494DF}">
-                  <a14:hiddenLine xmlns="" xmlns:a14="http://schemas.microsoft.com/office/drawing/2010/main" w="9525">
+                  <a14:hiddenLine xmlns:a14="http://schemas.microsoft.com/office/drawing/2010/main" xmlns="" w="9525">
                     <a:solidFill>
                       <a:srgbClr val="000000"/>
                     </a:solidFill>
@@ -13406,7 +13406,7 @@
               </a:ln>
               <a:extLst>
                 <a:ext uri="{91240B29-F687-4f45-9708-019B960494DF}">
-                  <a14:hiddenLine xmlns="" xmlns:a14="http://schemas.microsoft.com/office/drawing/2010/main" w="9525">
+                  <a14:hiddenLine xmlns:a14="http://schemas.microsoft.com/office/drawing/2010/main" xmlns="" w="9525">
                     <a:solidFill>
                       <a:srgbClr val="000000"/>
                     </a:solidFill>
@@ -13468,7 +13468,7 @@
               </a:ln>
               <a:extLst>
                 <a:ext uri="{91240B29-F687-4f45-9708-019B960494DF}">
-                  <a14:hiddenLine xmlns="" xmlns:a14="http://schemas.microsoft.com/office/drawing/2010/main" w="9525">
+                  <a14:hiddenLine xmlns:a14="http://schemas.microsoft.com/office/drawing/2010/main" xmlns="" w="9525">
                     <a:solidFill>
                       <a:srgbClr val="000000"/>
                     </a:solidFill>
@@ -13530,7 +13530,7 @@
               </a:ln>
               <a:extLst>
                 <a:ext uri="{91240B29-F687-4f45-9708-019B960494DF}">
-                  <a14:hiddenLine xmlns="" xmlns:a14="http://schemas.microsoft.com/office/drawing/2010/main" w="9525">
+                  <a14:hiddenLine xmlns:a14="http://schemas.microsoft.com/office/drawing/2010/main" xmlns="" w="9525">
                     <a:solidFill>
                       <a:srgbClr val="000000"/>
                     </a:solidFill>
@@ -13620,7 +13620,7 @@
               </a:ln>
               <a:extLst>
                 <a:ext uri="{91240B29-F687-4f45-9708-019B960494DF}">
-                  <a14:hiddenLine xmlns="" xmlns:a14="http://schemas.microsoft.com/office/drawing/2010/main" w="9525">
+                  <a14:hiddenLine xmlns:a14="http://schemas.microsoft.com/office/drawing/2010/main" xmlns="" w="9525">
                     <a:solidFill>
                       <a:srgbClr val="000000"/>
                     </a:solidFill>
@@ -13710,7 +13710,7 @@
               </a:ln>
               <a:extLst>
                 <a:ext uri="{91240B29-F687-4f45-9708-019B960494DF}">
-                  <a14:hiddenLine xmlns="" xmlns:a14="http://schemas.microsoft.com/office/drawing/2010/main" w="9525">
+                  <a14:hiddenLine xmlns:a14="http://schemas.microsoft.com/office/drawing/2010/main" xmlns="" w="9525">
                     <a:solidFill>
                       <a:srgbClr val="000000"/>
                     </a:solidFill>
@@ -13772,7 +13772,7 @@
               </a:ln>
               <a:extLst>
                 <a:ext uri="{91240B29-F687-4f45-9708-019B960494DF}">
-                  <a14:hiddenLine xmlns="" xmlns:a14="http://schemas.microsoft.com/office/drawing/2010/main" w="9525">
+                  <a14:hiddenLine xmlns:a14="http://schemas.microsoft.com/office/drawing/2010/main" xmlns="" w="9525">
                     <a:solidFill>
                       <a:srgbClr val="000000"/>
                     </a:solidFill>
@@ -13882,7 +13882,7 @@
               </a:ln>
               <a:extLst>
                 <a:ext uri="{91240B29-F687-4f45-9708-019B960494DF}">
-                  <a14:hiddenLine xmlns="" xmlns:a14="http://schemas.microsoft.com/office/drawing/2010/main" w="9525">
+                  <a14:hiddenLine xmlns:a14="http://schemas.microsoft.com/office/drawing/2010/main" xmlns="" w="9525">
                     <a:solidFill>
                       <a:srgbClr val="000000"/>
                     </a:solidFill>
@@ -13966,7 +13966,7 @@
               </a:ln>
               <a:extLst>
                 <a:ext uri="{91240B29-F687-4f45-9708-019B960494DF}">
-                  <a14:hiddenLine xmlns="" xmlns:a14="http://schemas.microsoft.com/office/drawing/2010/main" w="9525">
+                  <a14:hiddenLine xmlns:a14="http://schemas.microsoft.com/office/drawing/2010/main" xmlns="" w="9525">
                     <a:solidFill>
                       <a:srgbClr val="000000"/>
                     </a:solidFill>
@@ -14028,7 +14028,7 @@
               </a:ln>
               <a:extLst>
                 <a:ext uri="{91240B29-F687-4f45-9708-019B960494DF}">
-                  <a14:hiddenLine xmlns="" xmlns:a14="http://schemas.microsoft.com/office/drawing/2010/main" w="9525">
+                  <a14:hiddenLine xmlns:a14="http://schemas.microsoft.com/office/drawing/2010/main" xmlns="" w="9525">
                     <a:solidFill>
                       <a:srgbClr val="000000"/>
                     </a:solidFill>
@@ -14090,7 +14090,7 @@
               </a:ln>
               <a:extLst>
                 <a:ext uri="{91240B29-F687-4f45-9708-019B960494DF}">
-                  <a14:hiddenLine xmlns="" xmlns:a14="http://schemas.microsoft.com/office/drawing/2010/main" w="9525">
+                  <a14:hiddenLine xmlns:a14="http://schemas.microsoft.com/office/drawing/2010/main" xmlns="" w="9525">
                     <a:solidFill>
                       <a:srgbClr val="000000"/>
                     </a:solidFill>
@@ -14180,7 +14180,7 @@
               </a:ln>
               <a:extLst>
                 <a:ext uri="{91240B29-F687-4f45-9708-019B960494DF}">
-                  <a14:hiddenLine xmlns="" xmlns:a14="http://schemas.microsoft.com/office/drawing/2010/main" w="9525">
+                  <a14:hiddenLine xmlns:a14="http://schemas.microsoft.com/office/drawing/2010/main" xmlns="" w="9525">
                     <a:solidFill>
                       <a:srgbClr val="000000"/>
                     </a:solidFill>
@@ -14214,7 +14214,7 @@
               </a:ln>
               <a:extLst>
                 <a:ext uri="{91240B29-F687-4f45-9708-019B960494DF}">
-                  <a14:hiddenLine xmlns="" xmlns:a14="http://schemas.microsoft.com/office/drawing/2010/main" w="9525">
+                  <a14:hiddenLine xmlns:a14="http://schemas.microsoft.com/office/drawing/2010/main" xmlns="" w="9525">
                     <a:solidFill>
                       <a:srgbClr val="000000"/>
                     </a:solidFill>
@@ -14279,7 +14279,7 @@
               </a:ln>
               <a:extLst>
                 <a:ext uri="{91240B29-F687-4f45-9708-019B960494DF}">
-                  <a14:hiddenLine xmlns="" xmlns:a14="http://schemas.microsoft.com/office/drawing/2010/main" w="9525">
+                  <a14:hiddenLine xmlns:a14="http://schemas.microsoft.com/office/drawing/2010/main" xmlns="" w="9525">
                     <a:solidFill>
                       <a:srgbClr val="000000"/>
                     </a:solidFill>
@@ -14369,7 +14369,7 @@
               </a:ln>
               <a:extLst>
                 <a:ext uri="{91240B29-F687-4f45-9708-019B960494DF}">
-                  <a14:hiddenLine xmlns="" xmlns:a14="http://schemas.microsoft.com/office/drawing/2010/main" w="9525">
+                  <a14:hiddenLine xmlns:a14="http://schemas.microsoft.com/office/drawing/2010/main" xmlns="" w="9525">
                     <a:solidFill>
                       <a:srgbClr val="000000"/>
                     </a:solidFill>
@@ -14431,7 +14431,7 @@
               </a:ln>
               <a:extLst>
                 <a:ext uri="{91240B29-F687-4f45-9708-019B960494DF}">
-                  <a14:hiddenLine xmlns="" xmlns:a14="http://schemas.microsoft.com/office/drawing/2010/main" w="9525">
+                  <a14:hiddenLine xmlns:a14="http://schemas.microsoft.com/office/drawing/2010/main" xmlns="" w="9525">
                     <a:solidFill>
                       <a:srgbClr val="000000"/>
                     </a:solidFill>
@@ -14521,7 +14521,7 @@
               </a:ln>
               <a:extLst>
                 <a:ext uri="{91240B29-F687-4f45-9708-019B960494DF}">
-                  <a14:hiddenLine xmlns="" xmlns:a14="http://schemas.microsoft.com/office/drawing/2010/main" w="9525">
+                  <a14:hiddenLine xmlns:a14="http://schemas.microsoft.com/office/drawing/2010/main" xmlns="" w="9525">
                     <a:solidFill>
                       <a:srgbClr val="000000"/>
                     </a:solidFill>
@@ -14586,7 +14586,7 @@
               </a:ln>
               <a:extLst>
                 <a:ext uri="{91240B29-F687-4f45-9708-019B960494DF}">
-                  <a14:hiddenLine xmlns="" xmlns:a14="http://schemas.microsoft.com/office/drawing/2010/main" w="9525">
+                  <a14:hiddenLine xmlns:a14="http://schemas.microsoft.com/office/drawing/2010/main" xmlns="" w="9525">
                     <a:solidFill>
                       <a:srgbClr val="000000"/>
                     </a:solidFill>
@@ -14648,7 +14648,7 @@
               </a:ln>
               <a:extLst>
                 <a:ext uri="{91240B29-F687-4f45-9708-019B960494DF}">
-                  <a14:hiddenLine xmlns="" xmlns:a14="http://schemas.microsoft.com/office/drawing/2010/main" w="9525">
+                  <a14:hiddenLine xmlns:a14="http://schemas.microsoft.com/office/drawing/2010/main" xmlns="" w="9525">
                     <a:solidFill>
                       <a:srgbClr val="000000"/>
                     </a:solidFill>
@@ -14738,7 +14738,7 @@
               </a:ln>
               <a:extLst>
                 <a:ext uri="{91240B29-F687-4f45-9708-019B960494DF}">
-                  <a14:hiddenLine xmlns="" xmlns:a14="http://schemas.microsoft.com/office/drawing/2010/main" w="9525">
+                  <a14:hiddenLine xmlns:a14="http://schemas.microsoft.com/office/drawing/2010/main" xmlns="" w="9525">
                     <a:solidFill>
                       <a:srgbClr val="000000"/>
                     </a:solidFill>
@@ -14828,7 +14828,7 @@
               </a:ln>
               <a:extLst>
                 <a:ext uri="{91240B29-F687-4f45-9708-019B960494DF}">
-                  <a14:hiddenLine xmlns="" xmlns:a14="http://schemas.microsoft.com/office/drawing/2010/main" w="9525">
+                  <a14:hiddenLine xmlns:a14="http://schemas.microsoft.com/office/drawing/2010/main" xmlns="" w="9525">
                     <a:solidFill>
                       <a:srgbClr val="000000"/>
                     </a:solidFill>
@@ -14893,7 +14893,7 @@
               </a:ln>
               <a:extLst>
                 <a:ext uri="{91240B29-F687-4f45-9708-019B960494DF}">
-                  <a14:hiddenLine xmlns="" xmlns:a14="http://schemas.microsoft.com/office/drawing/2010/main" w="9525">
+                  <a14:hiddenLine xmlns:a14="http://schemas.microsoft.com/office/drawing/2010/main" xmlns="" w="9525">
                     <a:solidFill>
                       <a:srgbClr val="000000"/>
                     </a:solidFill>
@@ -15013,7 +15013,7 @@
               </a:ln>
               <a:extLst>
                 <a:ext uri="{91240B29-F687-4f45-9708-019B960494DF}">
-                  <a14:hiddenLine xmlns="" xmlns:a14="http://schemas.microsoft.com/office/drawing/2010/main" w="9525">
+                  <a14:hiddenLine xmlns:a14="http://schemas.microsoft.com/office/drawing/2010/main" xmlns="" w="9525">
                     <a:solidFill>
                       <a:srgbClr val="000000"/>
                     </a:solidFill>
@@ -15111,7 +15111,7 @@
               </a:ln>
               <a:extLst>
                 <a:ext uri="{91240B29-F687-4f45-9708-019B960494DF}">
-                  <a14:hiddenLine xmlns="" xmlns:a14="http://schemas.microsoft.com/office/drawing/2010/main" w="9525">
+                  <a14:hiddenLine xmlns:a14="http://schemas.microsoft.com/office/drawing/2010/main" xmlns="" w="9525">
                     <a:solidFill>
                       <a:srgbClr val="000000"/>
                     </a:solidFill>
@@ -15226,7 +15226,7 @@
               </a:ln>
               <a:extLst>
                 <a:ext uri="{91240B29-F687-4f45-9708-019B960494DF}">
-                  <a14:hiddenLine xmlns="" xmlns:a14="http://schemas.microsoft.com/office/drawing/2010/main" w="9525">
+                  <a14:hiddenLine xmlns:a14="http://schemas.microsoft.com/office/drawing/2010/main" xmlns="" w="9525">
                     <a:solidFill>
                       <a:srgbClr val="000000"/>
                     </a:solidFill>
@@ -15316,7 +15316,7 @@
               </a:ln>
               <a:extLst>
                 <a:ext uri="{91240B29-F687-4f45-9708-019B960494DF}">
-                  <a14:hiddenLine xmlns="" xmlns:a14="http://schemas.microsoft.com/office/drawing/2010/main" w="9525">
+                  <a14:hiddenLine xmlns:a14="http://schemas.microsoft.com/office/drawing/2010/main" xmlns="" w="9525">
                     <a:solidFill>
                       <a:srgbClr val="000000"/>
                     </a:solidFill>
@@ -15381,7 +15381,7 @@
               </a:ln>
               <a:extLst>
                 <a:ext uri="{91240B29-F687-4f45-9708-019B960494DF}">
-                  <a14:hiddenLine xmlns="" xmlns:a14="http://schemas.microsoft.com/office/drawing/2010/main" w="9525">
+                  <a14:hiddenLine xmlns:a14="http://schemas.microsoft.com/office/drawing/2010/main" xmlns="" w="9525">
                     <a:solidFill>
                       <a:srgbClr val="000000"/>
                     </a:solidFill>
@@ -15471,7 +15471,7 @@
               </a:ln>
               <a:extLst>
                 <a:ext uri="{91240B29-F687-4f45-9708-019B960494DF}">
-                  <a14:hiddenLine xmlns="" xmlns:a14="http://schemas.microsoft.com/office/drawing/2010/main" w="9525">
+                  <a14:hiddenLine xmlns:a14="http://schemas.microsoft.com/office/drawing/2010/main" xmlns="" w="9525">
                     <a:solidFill>
                       <a:srgbClr val="000000"/>
                     </a:solidFill>
@@ -15539,7 +15539,7 @@
               </a:ln>
               <a:extLst>
                 <a:ext uri="{91240B29-F687-4f45-9708-019B960494DF}">
-                  <a14:hiddenLine xmlns="" xmlns:a14="http://schemas.microsoft.com/office/drawing/2010/main" w="9525">
+                  <a14:hiddenLine xmlns:a14="http://schemas.microsoft.com/office/drawing/2010/main" xmlns="" w="9525">
                     <a:solidFill>
                       <a:srgbClr val="000000"/>
                     </a:solidFill>
@@ -15629,7 +15629,7 @@
               </a:ln>
               <a:extLst>
                 <a:ext uri="{91240B29-F687-4f45-9708-019B960494DF}">
-                  <a14:hiddenLine xmlns="" xmlns:a14="http://schemas.microsoft.com/office/drawing/2010/main" w="9525">
+                  <a14:hiddenLine xmlns:a14="http://schemas.microsoft.com/office/drawing/2010/main" xmlns="" w="9525">
                     <a:solidFill>
                       <a:srgbClr val="000000"/>
                     </a:solidFill>
@@ -15697,7 +15697,7 @@
               </a:ln>
               <a:extLst>
                 <a:ext uri="{91240B29-F687-4f45-9708-019B960494DF}">
-                  <a14:hiddenLine xmlns="" xmlns:a14="http://schemas.microsoft.com/office/drawing/2010/main" w="9525">
+                  <a14:hiddenLine xmlns:a14="http://schemas.microsoft.com/office/drawing/2010/main" xmlns="" w="9525">
                     <a:solidFill>
                       <a:srgbClr val="000000"/>
                     </a:solidFill>
@@ -15787,7 +15787,7 @@
               </a:ln>
               <a:extLst>
                 <a:ext uri="{91240B29-F687-4f45-9708-019B960494DF}">
-                  <a14:hiddenLine xmlns="" xmlns:a14="http://schemas.microsoft.com/office/drawing/2010/main" w="9525">
+                  <a14:hiddenLine xmlns:a14="http://schemas.microsoft.com/office/drawing/2010/main" xmlns="" w="9525">
                     <a:solidFill>
                       <a:srgbClr val="000000"/>
                     </a:solidFill>
@@ -15821,7 +15821,7 @@
               </a:ln>
               <a:extLst>
                 <a:ext uri="{91240B29-F687-4f45-9708-019B960494DF}">
-                  <a14:hiddenLine xmlns="" xmlns:a14="http://schemas.microsoft.com/office/drawing/2010/main" w="9525">
+                  <a14:hiddenLine xmlns:a14="http://schemas.microsoft.com/office/drawing/2010/main" xmlns="" w="9525">
                     <a:solidFill>
                       <a:srgbClr val="000000"/>
                     </a:solidFill>
@@ -15962,7 +15962,7 @@
             <a:fld id="{48A87A34-81AB-432B-8DAE-1953F412C126}" type="datetimeFigureOut">
               <a:rPr lang="en-US" dirty="0"/>
               <a:pPr/>
-              <a:t>11/29/2018</a:t>
+              <a:t>11/29/18</a:t>
             </a:fld>
             <a:endParaRPr lang="en-US" dirty="0"/>
           </a:p>
@@ -20313,7 +20313,7 @@
         <p:spPr/>
         <p:txBody>
           <a:bodyPr>
-            <a:normAutofit fontScale="92500" lnSpcReduction="10000"/>
+            <a:normAutofit fontScale="85000" lnSpcReduction="10000"/>
           </a:bodyPr>
           <a:lstStyle/>
           <a:p>
@@ -20391,22 +20391,54 @@
             <a:endParaRPr lang="en-GB" dirty="0" smtClean="0"/>
           </a:p>
           <a:p>
-            <a:r>
-              <a:rPr lang="en-GB" dirty="0" smtClean="0"/>
-              <a:t>https</a:t>
-            </a:r>
-            <a:r>
-              <a:rPr lang="en-GB" dirty="0"/>
-              <a:t>://</a:t>
-            </a:r>
-            <a:r>
-              <a:rPr lang="en-GB" dirty="0" err="1"/>
-              <a:t>towardsdatascience.com</a:t>
-            </a:r>
-            <a:r>
-              <a:rPr lang="en-GB" dirty="0"/>
+            <a:pPr lvl="0"/>
+            <a:r>
+              <a:rPr lang="en-US" altLang="en-US" dirty="0" err="1">
+                <a:latin typeface="Arial" charset="0"/>
+              </a:rPr>
+              <a:t>Mallawaarachchi</a:t>
+            </a:r>
+            <a:r>
+              <a:rPr lang="en-US" altLang="en-US" dirty="0">
+                <a:latin typeface="Arial" charset="0"/>
+              </a:rPr>
+              <a:t>, V. (2017) </a:t>
+            </a:r>
+            <a:r>
+              <a:rPr lang="en-US" altLang="en-US" i="1" dirty="0">
+                <a:latin typeface="Arial" charset="0"/>
+              </a:rPr>
+              <a:t>Introduction to Genetic Algorithms — Including Example Code</a:t>
+            </a:r>
+            <a:r>
+              <a:rPr lang="en-US" altLang="en-US" dirty="0">
+                <a:latin typeface="Arial" charset="0"/>
+              </a:rPr>
+              <a:t> [Online]. Available from: </a:t>
+            </a:r>
+            <a:r>
+              <a:rPr lang="en-US" altLang="en-US" u="sng" dirty="0">
+                <a:latin typeface="Arial" charset="0"/>
+                <a:hlinkClick r:id="rId2"/>
+              </a:rPr>
+              <a:t>https://towardsdatascience.com</a:t>
+            </a:r>
+            <a:r>
+              <a:rPr lang="en-US" altLang="en-US" u="sng">
+                <a:latin typeface="Arial" charset="0"/>
+                <a:hlinkClick r:id="rId2"/>
+              </a:rPr>
               <a:t>/introduction-to-genetic-algorithms-including-example-code-e396e98d8bf3</a:t>
             </a:r>
+            <a:r>
+              <a:rPr lang="en-US" altLang="en-US" u="sng">
+                <a:latin typeface="Arial" charset="0"/>
+              </a:rPr>
+              <a:t> [Accessed 15 November 2018].</a:t>
+            </a:r>
+            <a:endParaRPr lang="en-US" altLang="en-US">
+              <a:latin typeface="Arial" charset="0"/>
+            </a:endParaRPr>
           </a:p>
           <a:p>
             <a:endParaRPr lang="en-GB" dirty="0"/>

</xml_diff>